<commit_message>
auto commit Fri Jan 12 14:46:11 CET 2018
</commit_message>
<xml_diff>
--- a/raw/figures/rw/pw-life-cycle-rebuilt.pptx
+++ b/raw/figures/rw/pw-life-cycle-rebuilt.pptx
@@ -6,6 +6,7 @@
   </p:sldMasterIdLst>
   <p:sldIdLst>
     <p:sldId id="257" r:id="rId2"/>
+    <p:sldId id="258" r:id="rId3"/>
   </p:sldIdLst>
   <p:sldSz cx="12192000" cy="6858000"/>
   <p:notesSz cx="6858000" cy="9144000"/>
@@ -104,7 +105,889 @@
       </a:defRPr>
     </a:lvl9pPr>
   </p:defaultTextStyle>
+  <p:extLst>
+    <p:ext uri="{EFAFB233-063F-42B5-8137-9DF3F51BA10A}">
+      <p15:sldGuideLst xmlns:p15="http://schemas.microsoft.com/office/powerpoint/2012/main"/>
+    </p:ext>
+  </p:extLst>
 </p:presentation>
+</file>
+
+<file path=ppt/charts/chart1.xml><?xml version="1.0" encoding="utf-8"?>
+<c:chartSpace xmlns:c="http://schemas.openxmlformats.org/drawingml/2006/chart" xmlns:a="http://schemas.openxmlformats.org/drawingml/2006/main" xmlns:r="http://schemas.openxmlformats.org/officeDocument/2006/relationships">
+  <c:date1904 val="0"/>
+  <c:lang val="en-US"/>
+  <c:roundedCorners val="0"/>
+  <mc:AlternateContent xmlns:mc="http://schemas.openxmlformats.org/markup-compatibility/2006">
+    <mc:Choice xmlns:c14="http://schemas.microsoft.com/office/drawing/2007/8/2/chart" Requires="c14">
+      <c14:style val="102"/>
+    </mc:Choice>
+    <mc:Fallback>
+      <c:style val="2"/>
+    </mc:Fallback>
+  </mc:AlternateContent>
+  <c:chart>
+    <c:autoTitleDeleted val="1"/>
+    <c:plotArea>
+      <c:layout/>
+      <c:barChart>
+        <c:barDir val="bar"/>
+        <c:grouping val="clustered"/>
+        <c:varyColors val="0"/>
+        <c:ser>
+          <c:idx val="0"/>
+          <c:order val="0"/>
+          <c:tx>
+            <c:strRef>
+              <c:f>Sheet1!$B$1</c:f>
+              <c:strCache>
+                <c:ptCount val="1"/>
+                <c:pt idx="0">
+                  <c:v>Series 1</c:v>
+                </c:pt>
+              </c:strCache>
+            </c:strRef>
+          </c:tx>
+          <c:spPr>
+            <a:solidFill>
+              <a:schemeClr val="accent1"/>
+            </a:solidFill>
+            <a:ln>
+              <a:noFill/>
+            </a:ln>
+            <a:effectLst/>
+          </c:spPr>
+          <c:invertIfNegative val="0"/>
+          <c:dLbls>
+            <c:spPr>
+              <a:noFill/>
+              <a:ln>
+                <a:noFill/>
+              </a:ln>
+              <a:effectLst/>
+            </c:spPr>
+            <c:txPr>
+              <a:bodyPr rot="0" spcFirstLastPara="1" vertOverflow="ellipsis" vert="horz" wrap="square" lIns="38100" tIns="19050" rIns="38100" bIns="19050" anchor="ctr" anchorCtr="1">
+                <a:spAutoFit/>
+              </a:bodyPr>
+              <a:lstStyle/>
+              <a:p>
+                <a:pPr>
+                  <a:defRPr sz="1400" b="0" i="0" u="none" strike="noStrike" kern="1200" baseline="0">
+                    <a:solidFill>
+                      <a:schemeClr val="bg1"/>
+                    </a:solidFill>
+                    <a:latin typeface="Arial" charset="0"/>
+                    <a:ea typeface="Arial" charset="0"/>
+                    <a:cs typeface="Arial" charset="0"/>
+                  </a:defRPr>
+                </a:pPr>
+                <a:endParaRPr lang="en-US"/>
+              </a:p>
+            </c:txPr>
+            <c:dLblPos val="inEnd"/>
+            <c:showLegendKey val="0"/>
+            <c:showVal val="1"/>
+            <c:showCatName val="0"/>
+            <c:showSerName val="0"/>
+            <c:showPercent val="0"/>
+            <c:showBubbleSize val="0"/>
+            <c:showLeaderLines val="0"/>
+            <c:extLst>
+              <c:ext xmlns:c15="http://schemas.microsoft.com/office/drawing/2012/chart" uri="{CE6537A1-D6FC-4f65-9D91-7224C49458BB}">
+                <c15:layout/>
+                <c15:showLeaderLines val="1"/>
+                <c15:leaderLines>
+                  <c:spPr>
+                    <a:ln w="9525" cap="flat" cmpd="sng" algn="ctr">
+                      <a:solidFill>
+                        <a:schemeClr val="tx1">
+                          <a:lumMod val="35000"/>
+                          <a:lumOff val="65000"/>
+                        </a:schemeClr>
+                      </a:solidFill>
+                      <a:round/>
+                    </a:ln>
+                    <a:effectLst/>
+                  </c:spPr>
+                </c15:leaderLines>
+              </c:ext>
+            </c:extLst>
+          </c:dLbls>
+          <c:cat>
+            <c:strRef>
+              <c:f>Sheet1!$A$2:$A$11</c:f>
+              <c:strCache>
+                <c:ptCount val="10"/>
+                <c:pt idx="0">
+                  <c:v>None of these</c:v>
+                </c:pt>
+                <c:pt idx="1">
+                  <c:v>Some other technique</c:v>
+                </c:pt>
+                <c:pt idx="2">
+                  <c:v>Passwords are generated by specialist software</c:v>
+                </c:pt>
+                <c:pt idx="3">
+                  <c:v>Spelling words backwards</c:v>
+                </c:pt>
+                <c:pt idx="4">
+                  <c:v>Based on a mnemonic / acronym of a phrase</c:v>
+                </c:pt>
+                <c:pt idx="5">
+                  <c:v>Substituting numbers for letters</c:v>
+                </c:pt>
+                <c:pt idx="6">
+                  <c:v>Avoid using dictionary words or names</c:v>
+                </c:pt>
+                <c:pt idx="7">
+                  <c:v>Use non–alphabetical / numeric characters</c:v>
+                </c:pt>
+                <c:pt idx="8">
+                  <c:v>Use upper and lower case letters</c:v>
+                </c:pt>
+                <c:pt idx="9">
+                  <c:v>Combination of letters and numbers</c:v>
+                </c:pt>
+              </c:strCache>
+            </c:strRef>
+          </c:cat>
+          <c:val>
+            <c:numRef>
+              <c:f>Sheet1!$B$2:$B$11</c:f>
+              <c:numCache>
+                <c:formatCode>General</c:formatCode>
+                <c:ptCount val="10"/>
+                <c:pt idx="0">
+                  <c:v>12.0</c:v>
+                </c:pt>
+                <c:pt idx="1">
+                  <c:v>2.0</c:v>
+                </c:pt>
+                <c:pt idx="2">
+                  <c:v>4.0</c:v>
+                </c:pt>
+                <c:pt idx="3">
+                  <c:v>6.0</c:v>
+                </c:pt>
+                <c:pt idx="4">
+                  <c:v>8.0</c:v>
+                </c:pt>
+                <c:pt idx="5">
+                  <c:v>11.0</c:v>
+                </c:pt>
+                <c:pt idx="6">
+                  <c:v>13.0</c:v>
+                </c:pt>
+                <c:pt idx="7">
+                  <c:v>37.0</c:v>
+                </c:pt>
+                <c:pt idx="8">
+                  <c:v>47.0</c:v>
+                </c:pt>
+                <c:pt idx="9">
+                  <c:v>64.0</c:v>
+                </c:pt>
+              </c:numCache>
+            </c:numRef>
+          </c:val>
+        </c:ser>
+        <c:dLbls>
+          <c:showLegendKey val="0"/>
+          <c:showVal val="0"/>
+          <c:showCatName val="0"/>
+          <c:showSerName val="0"/>
+          <c:showPercent val="0"/>
+          <c:showBubbleSize val="0"/>
+        </c:dLbls>
+        <c:gapWidth val="32"/>
+        <c:axId val="-1189948048"/>
+        <c:axId val="-1189182512"/>
+      </c:barChart>
+      <c:catAx>
+        <c:axId val="-1189948048"/>
+        <c:scaling>
+          <c:orientation val="minMax"/>
+        </c:scaling>
+        <c:delete val="0"/>
+        <c:axPos val="l"/>
+        <c:numFmt formatCode="General" sourceLinked="1"/>
+        <c:majorTickMark val="none"/>
+        <c:minorTickMark val="none"/>
+        <c:tickLblPos val="nextTo"/>
+        <c:spPr>
+          <a:noFill/>
+          <a:ln w="9525" cap="flat" cmpd="sng" algn="ctr">
+            <a:solidFill>
+              <a:schemeClr val="tx1">
+                <a:lumMod val="15000"/>
+                <a:lumOff val="85000"/>
+              </a:schemeClr>
+            </a:solidFill>
+            <a:round/>
+          </a:ln>
+          <a:effectLst/>
+        </c:spPr>
+        <c:txPr>
+          <a:bodyPr rot="-60000000" spcFirstLastPara="1" vertOverflow="ellipsis" vert="horz" wrap="square" anchor="ctr" anchorCtr="1"/>
+          <a:lstStyle/>
+          <a:p>
+            <a:pPr>
+              <a:defRPr sz="2000" b="0" i="0" u="none" strike="noStrike" kern="1200" baseline="0">
+                <a:solidFill>
+                  <a:schemeClr val="tx1">
+                    <a:lumMod val="65000"/>
+                    <a:lumOff val="35000"/>
+                  </a:schemeClr>
+                </a:solidFill>
+                <a:latin typeface="Arial" charset="0"/>
+                <a:ea typeface="Arial" charset="0"/>
+                <a:cs typeface="Arial" charset="0"/>
+              </a:defRPr>
+            </a:pPr>
+            <a:endParaRPr lang="en-US"/>
+          </a:p>
+        </c:txPr>
+        <c:crossAx val="-1189182512"/>
+        <c:crosses val="autoZero"/>
+        <c:auto val="1"/>
+        <c:lblAlgn val="ctr"/>
+        <c:lblOffset val="100"/>
+        <c:noMultiLvlLbl val="0"/>
+      </c:catAx>
+      <c:valAx>
+        <c:axId val="-1189182512"/>
+        <c:scaling>
+          <c:orientation val="minMax"/>
+        </c:scaling>
+        <c:delete val="0"/>
+        <c:axPos val="b"/>
+        <c:majorGridlines>
+          <c:spPr>
+            <a:ln w="9525" cap="flat" cmpd="sng" algn="ctr">
+              <a:solidFill>
+                <a:schemeClr val="tx1">
+                  <a:lumMod val="15000"/>
+                  <a:lumOff val="85000"/>
+                </a:schemeClr>
+              </a:solidFill>
+              <a:round/>
+            </a:ln>
+            <a:effectLst/>
+          </c:spPr>
+        </c:majorGridlines>
+        <c:majorTickMark val="none"/>
+        <c:minorTickMark val="none"/>
+        <c:tickLblPos val="nextTo"/>
+        <c:spPr>
+          <a:noFill/>
+          <a:ln>
+            <a:noFill/>
+          </a:ln>
+          <a:effectLst/>
+        </c:spPr>
+        <c:txPr>
+          <a:bodyPr rot="-60000000" spcFirstLastPara="1" vertOverflow="ellipsis" vert="horz" wrap="square" anchor="ctr" anchorCtr="1"/>
+          <a:lstStyle/>
+          <a:p>
+            <a:pPr>
+              <a:defRPr sz="1400" b="0" i="0" u="none" strike="noStrike" kern="1200" baseline="0">
+                <a:solidFill>
+                  <a:schemeClr val="tx1">
+                    <a:lumMod val="65000"/>
+                    <a:lumOff val="35000"/>
+                  </a:schemeClr>
+                </a:solidFill>
+                <a:latin typeface="Arial" charset="0"/>
+                <a:ea typeface="Arial" charset="0"/>
+                <a:cs typeface="Arial" charset="0"/>
+              </a:defRPr>
+            </a:pPr>
+            <a:endParaRPr lang="en-US"/>
+          </a:p>
+        </c:txPr>
+        <c:crossAx val="-1189948048"/>
+        <c:crosses val="autoZero"/>
+        <c:crossBetween val="between"/>
+      </c:valAx>
+      <c:spPr>
+        <a:noFill/>
+        <a:ln>
+          <a:noFill/>
+        </a:ln>
+        <a:effectLst/>
+      </c:spPr>
+    </c:plotArea>
+    <c:plotVisOnly val="1"/>
+    <c:dispBlanksAs val="gap"/>
+    <c:showDLblsOverMax val="0"/>
+  </c:chart>
+  <c:spPr>
+    <a:noFill/>
+    <a:ln>
+      <a:noFill/>
+    </a:ln>
+    <a:effectLst/>
+  </c:spPr>
+  <c:txPr>
+    <a:bodyPr/>
+    <a:lstStyle/>
+    <a:p>
+      <a:pPr>
+        <a:defRPr/>
+      </a:pPr>
+      <a:endParaRPr lang="en-US"/>
+    </a:p>
+  </c:txPr>
+  <c:externalData r:id="rId3">
+    <c:autoUpdate val="0"/>
+  </c:externalData>
+</c:chartSpace>
+</file>
+
+<file path=ppt/charts/colors1.xml><?xml version="1.0" encoding="utf-8"?>
+<cs:colorStyle xmlns:cs="http://schemas.microsoft.com/office/drawing/2012/chartStyle" xmlns:a="http://schemas.openxmlformats.org/drawingml/2006/main" meth="cycle" id="10">
+  <a:schemeClr val="accent1"/>
+  <a:schemeClr val="accent2"/>
+  <a:schemeClr val="accent3"/>
+  <a:schemeClr val="accent4"/>
+  <a:schemeClr val="accent5"/>
+  <a:schemeClr val="accent6"/>
+  <cs:variation/>
+  <cs:variation>
+    <a:lumMod val="60000"/>
+  </cs:variation>
+  <cs:variation>
+    <a:lumMod val="80000"/>
+    <a:lumOff val="20000"/>
+  </cs:variation>
+  <cs:variation>
+    <a:lumMod val="80000"/>
+  </cs:variation>
+  <cs:variation>
+    <a:lumMod val="60000"/>
+    <a:lumOff val="40000"/>
+  </cs:variation>
+  <cs:variation>
+    <a:lumMod val="50000"/>
+  </cs:variation>
+  <cs:variation>
+    <a:lumMod val="70000"/>
+    <a:lumOff val="30000"/>
+  </cs:variation>
+  <cs:variation>
+    <a:lumMod val="70000"/>
+  </cs:variation>
+  <cs:variation>
+    <a:lumMod val="50000"/>
+    <a:lumOff val="50000"/>
+  </cs:variation>
+</cs:colorStyle>
+</file>
+
+<file path=ppt/charts/style1.xml><?xml version="1.0" encoding="utf-8"?>
+<cs:chartStyle xmlns:cs="http://schemas.microsoft.com/office/drawing/2012/chartStyle" xmlns:a="http://schemas.openxmlformats.org/drawingml/2006/main" id="216">
+  <cs:axisTitle>
+    <cs:lnRef idx="0"/>
+    <cs:fillRef idx="0"/>
+    <cs:effectRef idx="0"/>
+    <cs:fontRef idx="minor">
+      <a:schemeClr val="tx1">
+        <a:lumMod val="65000"/>
+        <a:lumOff val="35000"/>
+      </a:schemeClr>
+    </cs:fontRef>
+    <cs:defRPr sz="1330" kern="1200"/>
+  </cs:axisTitle>
+  <cs:categoryAxis>
+    <cs:lnRef idx="0"/>
+    <cs:fillRef idx="0"/>
+    <cs:effectRef idx="0"/>
+    <cs:fontRef idx="minor">
+      <a:schemeClr val="tx1">
+        <a:lumMod val="65000"/>
+        <a:lumOff val="35000"/>
+      </a:schemeClr>
+    </cs:fontRef>
+    <cs:spPr>
+      <a:ln w="9525" cap="flat" cmpd="sng" algn="ctr">
+        <a:solidFill>
+          <a:schemeClr val="tx1">
+            <a:lumMod val="15000"/>
+            <a:lumOff val="85000"/>
+          </a:schemeClr>
+        </a:solidFill>
+        <a:round/>
+      </a:ln>
+    </cs:spPr>
+    <cs:defRPr sz="1197" kern="1200"/>
+  </cs:categoryAxis>
+  <cs:chartArea mods="allowNoFillOverride allowNoLineOverride">
+    <cs:lnRef idx="0"/>
+    <cs:fillRef idx="0"/>
+    <cs:effectRef idx="0"/>
+    <cs:fontRef idx="minor">
+      <a:schemeClr val="tx1"/>
+    </cs:fontRef>
+    <cs:spPr>
+      <a:solidFill>
+        <a:schemeClr val="bg1"/>
+      </a:solidFill>
+      <a:ln w="9525" cap="flat" cmpd="sng" algn="ctr">
+        <a:solidFill>
+          <a:schemeClr val="tx1">
+            <a:lumMod val="15000"/>
+            <a:lumOff val="85000"/>
+          </a:schemeClr>
+        </a:solidFill>
+        <a:round/>
+      </a:ln>
+    </cs:spPr>
+    <cs:defRPr sz="1330" kern="1200"/>
+  </cs:chartArea>
+  <cs:dataLabel>
+    <cs:lnRef idx="0"/>
+    <cs:fillRef idx="0"/>
+    <cs:effectRef idx="0"/>
+    <cs:fontRef idx="minor">
+      <a:schemeClr val="tx1">
+        <a:lumMod val="75000"/>
+        <a:lumOff val="25000"/>
+      </a:schemeClr>
+    </cs:fontRef>
+    <cs:defRPr sz="1197" kern="1200"/>
+  </cs:dataLabel>
+  <cs:dataLabelCallout>
+    <cs:lnRef idx="0"/>
+    <cs:fillRef idx="0"/>
+    <cs:effectRef idx="0"/>
+    <cs:fontRef idx="minor">
+      <a:schemeClr val="dk1">
+        <a:lumMod val="65000"/>
+        <a:lumOff val="35000"/>
+      </a:schemeClr>
+    </cs:fontRef>
+    <cs:spPr>
+      <a:solidFill>
+        <a:schemeClr val="lt1"/>
+      </a:solidFill>
+      <a:ln>
+        <a:solidFill>
+          <a:schemeClr val="dk1">
+            <a:lumMod val="25000"/>
+            <a:lumOff val="75000"/>
+          </a:schemeClr>
+        </a:solidFill>
+      </a:ln>
+    </cs:spPr>
+    <cs:defRPr sz="1197" kern="1200"/>
+    <cs:bodyPr rot="0" spcFirstLastPara="1" vertOverflow="clip" horzOverflow="clip" vert="horz" wrap="square" lIns="36576" tIns="18288" rIns="36576" bIns="18288" anchor="ctr" anchorCtr="1">
+      <a:spAutoFit/>
+    </cs:bodyPr>
+  </cs:dataLabelCallout>
+  <cs:dataPoint>
+    <cs:lnRef idx="0"/>
+    <cs:fillRef idx="1">
+      <cs:styleClr val="auto"/>
+    </cs:fillRef>
+    <cs:effectRef idx="0"/>
+    <cs:fontRef idx="minor">
+      <a:schemeClr val="tx1"/>
+    </cs:fontRef>
+  </cs:dataPoint>
+  <cs:dataPoint3D>
+    <cs:lnRef idx="0"/>
+    <cs:fillRef idx="1">
+      <cs:styleClr val="auto"/>
+    </cs:fillRef>
+    <cs:effectRef idx="0"/>
+    <cs:fontRef idx="minor">
+      <a:schemeClr val="tx1"/>
+    </cs:fontRef>
+  </cs:dataPoint3D>
+  <cs:dataPointLine>
+    <cs:lnRef idx="0">
+      <cs:styleClr val="auto"/>
+    </cs:lnRef>
+    <cs:fillRef idx="1"/>
+    <cs:effectRef idx="0"/>
+    <cs:fontRef idx="minor">
+      <a:schemeClr val="tx1"/>
+    </cs:fontRef>
+    <cs:spPr>
+      <a:ln w="28575" cap="rnd">
+        <a:solidFill>
+          <a:schemeClr val="phClr"/>
+        </a:solidFill>
+        <a:round/>
+      </a:ln>
+    </cs:spPr>
+  </cs:dataPointLine>
+  <cs:dataPointMarker>
+    <cs:lnRef idx="0">
+      <cs:styleClr val="auto"/>
+    </cs:lnRef>
+    <cs:fillRef idx="1">
+      <cs:styleClr val="auto"/>
+    </cs:fillRef>
+    <cs:effectRef idx="0"/>
+    <cs:fontRef idx="minor">
+      <a:schemeClr val="tx1"/>
+    </cs:fontRef>
+    <cs:spPr>
+      <a:ln w="9525">
+        <a:solidFill>
+          <a:schemeClr val="phClr"/>
+        </a:solidFill>
+      </a:ln>
+    </cs:spPr>
+  </cs:dataPointMarker>
+  <cs:dataPointMarkerLayout symbol="circle" size="5"/>
+  <cs:dataPointWireframe>
+    <cs:lnRef idx="0">
+      <cs:styleClr val="auto"/>
+    </cs:lnRef>
+    <cs:fillRef idx="1"/>
+    <cs:effectRef idx="0"/>
+    <cs:fontRef idx="minor">
+      <a:schemeClr val="tx1"/>
+    </cs:fontRef>
+    <cs:spPr>
+      <a:ln w="9525" cap="rnd">
+        <a:solidFill>
+          <a:schemeClr val="phClr"/>
+        </a:solidFill>
+        <a:round/>
+      </a:ln>
+    </cs:spPr>
+  </cs:dataPointWireframe>
+  <cs:dataTable>
+    <cs:lnRef idx="0"/>
+    <cs:fillRef idx="0"/>
+    <cs:effectRef idx="0"/>
+    <cs:fontRef idx="minor">
+      <a:schemeClr val="tx1">
+        <a:lumMod val="65000"/>
+        <a:lumOff val="35000"/>
+      </a:schemeClr>
+    </cs:fontRef>
+    <cs:spPr>
+      <a:noFill/>
+      <a:ln w="9525" cap="flat" cmpd="sng" algn="ctr">
+        <a:solidFill>
+          <a:schemeClr val="tx1">
+            <a:lumMod val="15000"/>
+            <a:lumOff val="85000"/>
+          </a:schemeClr>
+        </a:solidFill>
+        <a:round/>
+      </a:ln>
+    </cs:spPr>
+    <cs:defRPr sz="1197" kern="1200"/>
+  </cs:dataTable>
+  <cs:downBar>
+    <cs:lnRef idx="0"/>
+    <cs:fillRef idx="0"/>
+    <cs:effectRef idx="0"/>
+    <cs:fontRef idx="minor">
+      <a:schemeClr val="tx1"/>
+    </cs:fontRef>
+    <cs:spPr>
+      <a:solidFill>
+        <a:schemeClr val="dk1">
+          <a:lumMod val="75000"/>
+          <a:lumOff val="25000"/>
+        </a:schemeClr>
+      </a:solidFill>
+      <a:ln w="9525" cap="flat" cmpd="sng" algn="ctr">
+        <a:solidFill>
+          <a:schemeClr val="tx1">
+            <a:lumMod val="65000"/>
+            <a:lumOff val="35000"/>
+          </a:schemeClr>
+        </a:solidFill>
+        <a:round/>
+      </a:ln>
+    </cs:spPr>
+  </cs:downBar>
+  <cs:dropLine>
+    <cs:lnRef idx="0"/>
+    <cs:fillRef idx="0"/>
+    <cs:effectRef idx="0"/>
+    <cs:fontRef idx="minor">
+      <a:schemeClr val="tx1"/>
+    </cs:fontRef>
+    <cs:spPr>
+      <a:ln w="9525" cap="flat" cmpd="sng" algn="ctr">
+        <a:solidFill>
+          <a:schemeClr val="tx1">
+            <a:lumMod val="35000"/>
+            <a:lumOff val="65000"/>
+          </a:schemeClr>
+        </a:solidFill>
+        <a:round/>
+      </a:ln>
+    </cs:spPr>
+  </cs:dropLine>
+  <cs:errorBar>
+    <cs:lnRef idx="0"/>
+    <cs:fillRef idx="0"/>
+    <cs:effectRef idx="0"/>
+    <cs:fontRef idx="minor">
+      <a:schemeClr val="tx1"/>
+    </cs:fontRef>
+    <cs:spPr>
+      <a:ln w="9525" cap="flat" cmpd="sng" algn="ctr">
+        <a:solidFill>
+          <a:schemeClr val="tx1">
+            <a:lumMod val="65000"/>
+            <a:lumOff val="35000"/>
+          </a:schemeClr>
+        </a:solidFill>
+        <a:round/>
+      </a:ln>
+    </cs:spPr>
+  </cs:errorBar>
+  <cs:floor>
+    <cs:lnRef idx="0"/>
+    <cs:fillRef idx="0"/>
+    <cs:effectRef idx="0"/>
+    <cs:fontRef idx="minor">
+      <a:schemeClr val="tx1"/>
+    </cs:fontRef>
+    <cs:spPr>
+      <a:noFill/>
+      <a:ln>
+        <a:noFill/>
+      </a:ln>
+    </cs:spPr>
+  </cs:floor>
+  <cs:gridlineMajor>
+    <cs:lnRef idx="0"/>
+    <cs:fillRef idx="0"/>
+    <cs:effectRef idx="0"/>
+    <cs:fontRef idx="minor">
+      <a:schemeClr val="tx1"/>
+    </cs:fontRef>
+    <cs:spPr>
+      <a:ln w="9525" cap="flat" cmpd="sng" algn="ctr">
+        <a:solidFill>
+          <a:schemeClr val="tx1">
+            <a:lumMod val="15000"/>
+            <a:lumOff val="85000"/>
+          </a:schemeClr>
+        </a:solidFill>
+        <a:round/>
+      </a:ln>
+    </cs:spPr>
+  </cs:gridlineMajor>
+  <cs:gridlineMinor>
+    <cs:lnRef idx="0"/>
+    <cs:fillRef idx="0"/>
+    <cs:effectRef idx="0"/>
+    <cs:fontRef idx="minor">
+      <a:schemeClr val="tx1"/>
+    </cs:fontRef>
+    <cs:spPr>
+      <a:ln w="9525" cap="flat" cmpd="sng" algn="ctr">
+        <a:solidFill>
+          <a:schemeClr val="tx1">
+            <a:lumMod val="5000"/>
+            <a:lumOff val="95000"/>
+          </a:schemeClr>
+        </a:solidFill>
+        <a:round/>
+      </a:ln>
+    </cs:spPr>
+  </cs:gridlineMinor>
+  <cs:hiLoLine>
+    <cs:lnRef idx="0"/>
+    <cs:fillRef idx="0"/>
+    <cs:effectRef idx="0"/>
+    <cs:fontRef idx="minor">
+      <a:schemeClr val="tx1"/>
+    </cs:fontRef>
+    <cs:spPr>
+      <a:ln w="9525" cap="flat" cmpd="sng" algn="ctr">
+        <a:solidFill>
+          <a:schemeClr val="tx1">
+            <a:lumMod val="50000"/>
+            <a:lumOff val="50000"/>
+          </a:schemeClr>
+        </a:solidFill>
+        <a:round/>
+      </a:ln>
+    </cs:spPr>
+  </cs:hiLoLine>
+  <cs:leaderLine>
+    <cs:lnRef idx="0"/>
+    <cs:fillRef idx="0"/>
+    <cs:effectRef idx="0"/>
+    <cs:fontRef idx="minor">
+      <a:schemeClr val="tx1"/>
+    </cs:fontRef>
+    <cs:spPr>
+      <a:ln w="9525" cap="flat" cmpd="sng" algn="ctr">
+        <a:solidFill>
+          <a:schemeClr val="tx1">
+            <a:lumMod val="35000"/>
+            <a:lumOff val="65000"/>
+          </a:schemeClr>
+        </a:solidFill>
+        <a:round/>
+      </a:ln>
+    </cs:spPr>
+  </cs:leaderLine>
+  <cs:legend>
+    <cs:lnRef idx="0"/>
+    <cs:fillRef idx="0"/>
+    <cs:effectRef idx="0"/>
+    <cs:fontRef idx="minor">
+      <a:schemeClr val="tx1">
+        <a:lumMod val="65000"/>
+        <a:lumOff val="35000"/>
+      </a:schemeClr>
+    </cs:fontRef>
+    <cs:defRPr sz="1197" kern="1200"/>
+  </cs:legend>
+  <cs:plotArea mods="allowNoFillOverride allowNoLineOverride">
+    <cs:lnRef idx="0"/>
+    <cs:fillRef idx="0"/>
+    <cs:effectRef idx="0"/>
+    <cs:fontRef idx="minor">
+      <a:schemeClr val="tx1"/>
+    </cs:fontRef>
+  </cs:plotArea>
+  <cs:plotArea3D mods="allowNoFillOverride allowNoLineOverride">
+    <cs:lnRef idx="0"/>
+    <cs:fillRef idx="0"/>
+    <cs:effectRef idx="0"/>
+    <cs:fontRef idx="minor">
+      <a:schemeClr val="tx1"/>
+    </cs:fontRef>
+  </cs:plotArea3D>
+  <cs:seriesAxis>
+    <cs:lnRef idx="0"/>
+    <cs:fillRef idx="0"/>
+    <cs:effectRef idx="0"/>
+    <cs:fontRef idx="minor">
+      <a:schemeClr val="tx1">
+        <a:lumMod val="65000"/>
+        <a:lumOff val="35000"/>
+      </a:schemeClr>
+    </cs:fontRef>
+    <cs:defRPr sz="1197" kern="1200"/>
+  </cs:seriesAxis>
+  <cs:seriesLine>
+    <cs:lnRef idx="0"/>
+    <cs:fillRef idx="0"/>
+    <cs:effectRef idx="0"/>
+    <cs:fontRef idx="minor">
+      <a:schemeClr val="tx1"/>
+    </cs:fontRef>
+    <cs:spPr>
+      <a:ln w="9525" cap="flat" cmpd="sng" algn="ctr">
+        <a:solidFill>
+          <a:schemeClr val="tx1">
+            <a:lumMod val="35000"/>
+            <a:lumOff val="65000"/>
+          </a:schemeClr>
+        </a:solidFill>
+        <a:round/>
+      </a:ln>
+    </cs:spPr>
+  </cs:seriesLine>
+  <cs:title>
+    <cs:lnRef idx="0"/>
+    <cs:fillRef idx="0"/>
+    <cs:effectRef idx="0"/>
+    <cs:fontRef idx="minor">
+      <a:schemeClr val="tx1">
+        <a:lumMod val="65000"/>
+        <a:lumOff val="35000"/>
+      </a:schemeClr>
+    </cs:fontRef>
+    <cs:defRPr sz="1862" b="0" kern="1200" spc="0" baseline="0"/>
+  </cs:title>
+  <cs:trendline>
+    <cs:lnRef idx="0">
+      <cs:styleClr val="auto"/>
+    </cs:lnRef>
+    <cs:fillRef idx="0"/>
+    <cs:effectRef idx="0"/>
+    <cs:fontRef idx="minor">
+      <a:schemeClr val="tx1"/>
+    </cs:fontRef>
+    <cs:spPr>
+      <a:ln w="19050" cap="rnd">
+        <a:solidFill>
+          <a:schemeClr val="phClr"/>
+        </a:solidFill>
+        <a:prstDash val="sysDot"/>
+      </a:ln>
+    </cs:spPr>
+  </cs:trendline>
+  <cs:trendlineLabel>
+    <cs:lnRef idx="0"/>
+    <cs:fillRef idx="0"/>
+    <cs:effectRef idx="0"/>
+    <cs:fontRef idx="minor">
+      <a:schemeClr val="tx1">
+        <a:lumMod val="65000"/>
+        <a:lumOff val="35000"/>
+      </a:schemeClr>
+    </cs:fontRef>
+    <cs:defRPr sz="1197" kern="1200"/>
+  </cs:trendlineLabel>
+  <cs:upBar>
+    <cs:lnRef idx="0"/>
+    <cs:fillRef idx="0"/>
+    <cs:effectRef idx="0"/>
+    <cs:fontRef idx="minor">
+      <a:schemeClr val="tx1"/>
+    </cs:fontRef>
+    <cs:spPr>
+      <a:solidFill>
+        <a:schemeClr val="lt1"/>
+      </a:solidFill>
+      <a:ln w="9525" cap="flat" cmpd="sng" algn="ctr">
+        <a:solidFill>
+          <a:schemeClr val="tx1">
+            <a:lumMod val="65000"/>
+            <a:lumOff val="35000"/>
+          </a:schemeClr>
+        </a:solidFill>
+        <a:round/>
+      </a:ln>
+    </cs:spPr>
+  </cs:upBar>
+  <cs:valueAxis>
+    <cs:lnRef idx="0"/>
+    <cs:fillRef idx="0"/>
+    <cs:effectRef idx="0"/>
+    <cs:fontRef idx="minor">
+      <a:schemeClr val="tx1">
+        <a:lumMod val="65000"/>
+        <a:lumOff val="35000"/>
+      </a:schemeClr>
+    </cs:fontRef>
+    <cs:defRPr sz="1197" kern="1200"/>
+  </cs:valueAxis>
+  <cs:wall>
+    <cs:lnRef idx="0"/>
+    <cs:fillRef idx="0"/>
+    <cs:effectRef idx="0"/>
+    <cs:fontRef idx="minor">
+      <a:schemeClr val="tx1"/>
+    </cs:fontRef>
+    <cs:spPr>
+      <a:noFill/>
+      <a:ln>
+        <a:noFill/>
+      </a:ln>
+    </cs:spPr>
+  </cs:wall>
+</cs:chartStyle>
 </file>
 
 <file path=ppt/slideLayouts/slideLayout1.xml><?xml version="1.0" encoding="utf-8"?>
@@ -238,7 +1121,7 @@
           <a:p>
             <a:fld id="{BCCC3F5F-73A4-A245-A21B-40DFEEF01980}" type="datetimeFigureOut">
               <a:rPr lang="en-US" smtClean="0"/>
-              <a:t>1/11/18</a:t>
+              <a:t>1/12/18</a:t>
             </a:fld>
             <a:endParaRPr lang="en-US"/>
           </a:p>
@@ -408,7 +1291,7 @@
           <a:p>
             <a:fld id="{BCCC3F5F-73A4-A245-A21B-40DFEEF01980}" type="datetimeFigureOut">
               <a:rPr lang="en-US" smtClean="0"/>
-              <a:t>1/11/18</a:t>
+              <a:t>1/12/18</a:t>
             </a:fld>
             <a:endParaRPr lang="en-US"/>
           </a:p>
@@ -588,7 +1471,7 @@
           <a:p>
             <a:fld id="{BCCC3F5F-73A4-A245-A21B-40DFEEF01980}" type="datetimeFigureOut">
               <a:rPr lang="en-US" smtClean="0"/>
-              <a:t>1/11/18</a:t>
+              <a:t>1/12/18</a:t>
             </a:fld>
             <a:endParaRPr lang="en-US"/>
           </a:p>
@@ -758,7 +1641,7 @@
           <a:p>
             <a:fld id="{BCCC3F5F-73A4-A245-A21B-40DFEEF01980}" type="datetimeFigureOut">
               <a:rPr lang="en-US" smtClean="0"/>
-              <a:t>1/11/18</a:t>
+              <a:t>1/12/18</a:t>
             </a:fld>
             <a:endParaRPr lang="en-US"/>
           </a:p>
@@ -1004,7 +1887,7 @@
           <a:p>
             <a:fld id="{BCCC3F5F-73A4-A245-A21B-40DFEEF01980}" type="datetimeFigureOut">
               <a:rPr lang="en-US" smtClean="0"/>
-              <a:t>1/11/18</a:t>
+              <a:t>1/12/18</a:t>
             </a:fld>
             <a:endParaRPr lang="en-US"/>
           </a:p>
@@ -1236,7 +2119,7 @@
           <a:p>
             <a:fld id="{BCCC3F5F-73A4-A245-A21B-40DFEEF01980}" type="datetimeFigureOut">
               <a:rPr lang="en-US" smtClean="0"/>
-              <a:t>1/11/18</a:t>
+              <a:t>1/12/18</a:t>
             </a:fld>
             <a:endParaRPr lang="en-US"/>
           </a:p>
@@ -1603,7 +2486,7 @@
           <a:p>
             <a:fld id="{BCCC3F5F-73A4-A245-A21B-40DFEEF01980}" type="datetimeFigureOut">
               <a:rPr lang="en-US" smtClean="0"/>
-              <a:t>1/11/18</a:t>
+              <a:t>1/12/18</a:t>
             </a:fld>
             <a:endParaRPr lang="en-US"/>
           </a:p>
@@ -1721,7 +2604,7 @@
           <a:p>
             <a:fld id="{BCCC3F5F-73A4-A245-A21B-40DFEEF01980}" type="datetimeFigureOut">
               <a:rPr lang="en-US" smtClean="0"/>
-              <a:t>1/11/18</a:t>
+              <a:t>1/12/18</a:t>
             </a:fld>
             <a:endParaRPr lang="en-US"/>
           </a:p>
@@ -1816,7 +2699,7 @@
           <a:p>
             <a:fld id="{BCCC3F5F-73A4-A245-A21B-40DFEEF01980}" type="datetimeFigureOut">
               <a:rPr lang="en-US" smtClean="0"/>
-              <a:t>1/11/18</a:t>
+              <a:t>1/12/18</a:t>
             </a:fld>
             <a:endParaRPr lang="en-US"/>
           </a:p>
@@ -2093,7 +2976,7 @@
           <a:p>
             <a:fld id="{BCCC3F5F-73A4-A245-A21B-40DFEEF01980}" type="datetimeFigureOut">
               <a:rPr lang="en-US" smtClean="0"/>
-              <a:t>1/11/18</a:t>
+              <a:t>1/12/18</a:t>
             </a:fld>
             <a:endParaRPr lang="en-US"/>
           </a:p>
@@ -2346,7 +3229,7 @@
           <a:p>
             <a:fld id="{BCCC3F5F-73A4-A245-A21B-40DFEEF01980}" type="datetimeFigureOut">
               <a:rPr lang="en-US" smtClean="0"/>
-              <a:t>1/11/18</a:t>
+              <a:t>1/12/18</a:t>
             </a:fld>
             <a:endParaRPr lang="en-US"/>
           </a:p>
@@ -2559,7 +3442,7 @@
           <a:p>
             <a:fld id="{BCCC3F5F-73A4-A245-A21B-40DFEEF01980}" type="datetimeFigureOut">
               <a:rPr lang="en-US" smtClean="0"/>
-              <a:t>1/11/18</a:t>
+              <a:t>1/12/18</a:t>
             </a:fld>
             <a:endParaRPr lang="en-US"/>
           </a:p>
@@ -3747,6 +4630,58 @@
 </p:sld>
 </file>
 
+<file path=ppt/slides/slide2.xml><?xml version="1.0" encoding="utf-8"?>
+<p:sld xmlns:a="http://schemas.openxmlformats.org/drawingml/2006/main" xmlns:r="http://schemas.openxmlformats.org/officeDocument/2006/relationships" xmlns:p="http://schemas.openxmlformats.org/presentationml/2006/main">
+  <p:cSld>
+    <p:spTree>
+      <p:nvGrpSpPr>
+        <p:cNvPr id="1" name=""/>
+        <p:cNvGrpSpPr/>
+        <p:nvPr/>
+      </p:nvGrpSpPr>
+      <p:grpSpPr>
+        <a:xfrm>
+          <a:off x="0" y="0"/>
+          <a:ext cx="0" cy="0"/>
+          <a:chOff x="0" y="0"/>
+          <a:chExt cx="0" cy="0"/>
+        </a:xfrm>
+      </p:grpSpPr>
+      <p:graphicFrame>
+        <p:nvGraphicFramePr>
+          <p:cNvPr id="2" name="Chart 1"/>
+          <p:cNvGraphicFramePr/>
+          <p:nvPr>
+            <p:extLst>
+              <p:ext uri="{D42A27DB-BD31-4B8C-83A1-F6EECF244321}">
+                <p14:modId xmlns:p14="http://schemas.microsoft.com/office/powerpoint/2010/main" val="1976075291"/>
+              </p:ext>
+            </p:extLst>
+          </p:nvPr>
+        </p:nvGraphicFramePr>
+        <p:xfrm>
+          <a:off x="218363" y="733313"/>
+          <a:ext cx="11859905" cy="5418667"/>
+        </p:xfrm>
+        <a:graphic>
+          <a:graphicData uri="http://schemas.openxmlformats.org/drawingml/2006/chart">
+            <c:chart xmlns:c="http://schemas.openxmlformats.org/drawingml/2006/chart" xmlns:r="http://schemas.openxmlformats.org/officeDocument/2006/relationships" r:id="rId2"/>
+          </a:graphicData>
+        </a:graphic>
+      </p:graphicFrame>
+    </p:spTree>
+    <p:extLst>
+      <p:ext uri="{BB962C8B-B14F-4D97-AF65-F5344CB8AC3E}">
+        <p14:creationId xmlns:p14="http://schemas.microsoft.com/office/powerpoint/2010/main" val="1442388757"/>
+      </p:ext>
+    </p:extLst>
+  </p:cSld>
+  <p:clrMapOvr>
+    <a:masterClrMapping/>
+  </p:clrMapOvr>
+</p:sld>
+</file>
+
 <file path=ppt/theme/theme1.xml><?xml version="1.0" encoding="utf-8"?>
 <a:theme xmlns:a="http://schemas.openxmlformats.org/drawingml/2006/main" name="Office Theme">
   <a:themeElements>

</xml_diff>

<commit_message>
auto commit Mon Jan 15 11:36:13 CET 2018
</commit_message>
<xml_diff>
--- a/raw/figures/rw/pw-life-cycle-rebuilt.pptx
+++ b/raw/figures/rw/pw-life-cycle-rebuilt.pptx
@@ -7,6 +7,7 @@
   <p:sldIdLst>
     <p:sldId id="257" r:id="rId2"/>
     <p:sldId id="258" r:id="rId3"/>
+    <p:sldId id="259" r:id="rId4"/>
   </p:sldIdLst>
   <p:sldSz cx="12192000" cy="6858000"/>
   <p:notesSz cx="6858000" cy="9144000"/>
@@ -4682,6 +4683,485 @@
 </p:sld>
 </file>
 
+<file path=ppt/slides/slide3.xml><?xml version="1.0" encoding="utf-8"?>
+<p:sld xmlns:a="http://schemas.openxmlformats.org/drawingml/2006/main" xmlns:r="http://schemas.openxmlformats.org/officeDocument/2006/relationships" xmlns:p="http://schemas.openxmlformats.org/presentationml/2006/main">
+  <p:cSld>
+    <p:spTree>
+      <p:nvGrpSpPr>
+        <p:cNvPr id="1" name=""/>
+        <p:cNvGrpSpPr/>
+        <p:nvPr/>
+      </p:nvGrpSpPr>
+      <p:grpSpPr>
+        <a:xfrm>
+          <a:off x="0" y="0"/>
+          <a:ext cx="0" cy="0"/>
+          <a:chOff x="0" y="0"/>
+          <a:chExt cx="0" cy="0"/>
+        </a:xfrm>
+      </p:grpSpPr>
+      <p:sp>
+        <p:nvSpPr>
+          <p:cNvPr id="5" name="Rectangle 4"/>
+          <p:cNvSpPr/>
+          <p:nvPr/>
+        </p:nvSpPr>
+        <p:spPr>
+          <a:xfrm>
+            <a:off x="3684895" y="573206"/>
+            <a:ext cx="4121624" cy="914400"/>
+          </a:xfrm>
+          <a:prstGeom prst="rect">
+            <a:avLst/>
+          </a:prstGeom>
+        </p:spPr>
+        <p:style>
+          <a:lnRef idx="2">
+            <a:schemeClr val="accent1">
+              <a:shade val="50000"/>
+            </a:schemeClr>
+          </a:lnRef>
+          <a:fillRef idx="1">
+            <a:schemeClr val="accent1"/>
+          </a:fillRef>
+          <a:effectRef idx="0">
+            <a:schemeClr val="accent1"/>
+          </a:effectRef>
+          <a:fontRef idx="minor">
+            <a:schemeClr val="lt1"/>
+          </a:fontRef>
+        </p:style>
+        <p:txBody>
+          <a:bodyPr rtlCol="0" anchor="ctr"/>
+          <a:lstStyle/>
+          <a:p>
+            <a:pPr algn="ctr"/>
+            <a:r>
+              <a:rPr lang="en-US" dirty="0" smtClean="0">
+                <a:latin typeface="Arial" charset="0"/>
+                <a:ea typeface="Arial" charset="0"/>
+                <a:cs typeface="Arial" charset="0"/>
+              </a:rPr>
+              <a:t>Persuasive Authentication Framework</a:t>
+            </a:r>
+            <a:endParaRPr lang="en-US" dirty="0">
+              <a:latin typeface="Arial" charset="0"/>
+              <a:ea typeface="Arial" charset="0"/>
+              <a:cs typeface="Arial" charset="0"/>
+            </a:endParaRPr>
+          </a:p>
+        </p:txBody>
+      </p:sp>
+      <p:sp>
+        <p:nvSpPr>
+          <p:cNvPr id="6" name="Rectangle 5"/>
+          <p:cNvSpPr/>
+          <p:nvPr/>
+        </p:nvSpPr>
+        <p:spPr>
+          <a:xfrm>
+            <a:off x="152400" y="2281451"/>
+            <a:ext cx="2699982" cy="914400"/>
+          </a:xfrm>
+          <a:prstGeom prst="rect">
+            <a:avLst/>
+          </a:prstGeom>
+        </p:spPr>
+        <p:style>
+          <a:lnRef idx="2">
+            <a:schemeClr val="accent1">
+              <a:shade val="50000"/>
+            </a:schemeClr>
+          </a:lnRef>
+          <a:fillRef idx="1">
+            <a:schemeClr val="accent1"/>
+          </a:fillRef>
+          <a:effectRef idx="0">
+            <a:schemeClr val="accent1"/>
+          </a:effectRef>
+          <a:fontRef idx="minor">
+            <a:schemeClr val="lt1"/>
+          </a:fontRef>
+        </p:style>
+        <p:txBody>
+          <a:bodyPr rtlCol="0" anchor="ctr"/>
+          <a:lstStyle/>
+          <a:p>
+            <a:pPr algn="ctr"/>
+            <a:r>
+              <a:rPr lang="en-US" dirty="0" smtClean="0">
+                <a:latin typeface="Arial" charset="0"/>
+                <a:ea typeface="Arial" charset="0"/>
+                <a:cs typeface="Arial" charset="0"/>
+              </a:rPr>
+              <a:t>Simplification</a:t>
+            </a:r>
+          </a:p>
+        </p:txBody>
+      </p:sp>
+      <p:sp>
+        <p:nvSpPr>
+          <p:cNvPr id="7" name="Rectangle 6"/>
+          <p:cNvSpPr/>
+          <p:nvPr/>
+        </p:nvSpPr>
+        <p:spPr>
+          <a:xfrm>
+            <a:off x="3045725" y="2281451"/>
+            <a:ext cx="2699982" cy="914400"/>
+          </a:xfrm>
+          <a:prstGeom prst="rect">
+            <a:avLst/>
+          </a:prstGeom>
+        </p:spPr>
+        <p:style>
+          <a:lnRef idx="2">
+            <a:schemeClr val="accent1">
+              <a:shade val="50000"/>
+            </a:schemeClr>
+          </a:lnRef>
+          <a:fillRef idx="1">
+            <a:schemeClr val="accent1"/>
+          </a:fillRef>
+          <a:effectRef idx="0">
+            <a:schemeClr val="accent1"/>
+          </a:effectRef>
+          <a:fontRef idx="minor">
+            <a:schemeClr val="lt1"/>
+          </a:fontRef>
+        </p:style>
+        <p:txBody>
+          <a:bodyPr rtlCol="0" anchor="ctr"/>
+          <a:lstStyle/>
+          <a:p>
+            <a:pPr algn="ctr"/>
+            <a:r>
+              <a:rPr lang="en-US" dirty="0" smtClean="0">
+                <a:latin typeface="Arial" charset="0"/>
+                <a:ea typeface="Arial" charset="0"/>
+                <a:cs typeface="Arial" charset="0"/>
+              </a:rPr>
+              <a:t>Personalization</a:t>
+            </a:r>
+          </a:p>
+        </p:txBody>
+      </p:sp>
+      <p:sp>
+        <p:nvSpPr>
+          <p:cNvPr id="8" name="Rectangle 7"/>
+          <p:cNvSpPr/>
+          <p:nvPr/>
+        </p:nvSpPr>
+        <p:spPr>
+          <a:xfrm>
+            <a:off x="5939050" y="2281451"/>
+            <a:ext cx="2699982" cy="914400"/>
+          </a:xfrm>
+          <a:prstGeom prst="rect">
+            <a:avLst/>
+          </a:prstGeom>
+        </p:spPr>
+        <p:style>
+          <a:lnRef idx="2">
+            <a:schemeClr val="accent1">
+              <a:shade val="50000"/>
+            </a:schemeClr>
+          </a:lnRef>
+          <a:fillRef idx="1">
+            <a:schemeClr val="accent1"/>
+          </a:fillRef>
+          <a:effectRef idx="0">
+            <a:schemeClr val="accent1"/>
+          </a:effectRef>
+          <a:fontRef idx="minor">
+            <a:schemeClr val="lt1"/>
+          </a:fontRef>
+        </p:style>
+        <p:txBody>
+          <a:bodyPr rtlCol="0" anchor="ctr"/>
+          <a:lstStyle/>
+          <a:p>
+            <a:pPr algn="ctr"/>
+            <a:r>
+              <a:rPr lang="en-US" dirty="0" smtClean="0">
+                <a:latin typeface="Arial" charset="0"/>
+                <a:ea typeface="Arial" charset="0"/>
+                <a:cs typeface="Arial" charset="0"/>
+              </a:rPr>
+              <a:t>Monitoring</a:t>
+            </a:r>
+          </a:p>
+        </p:txBody>
+      </p:sp>
+      <p:sp>
+        <p:nvSpPr>
+          <p:cNvPr id="9" name="Rectangle 8"/>
+          <p:cNvSpPr/>
+          <p:nvPr/>
+        </p:nvSpPr>
+        <p:spPr>
+          <a:xfrm>
+            <a:off x="8832375" y="2281451"/>
+            <a:ext cx="2699982" cy="914400"/>
+          </a:xfrm>
+          <a:prstGeom prst="rect">
+            <a:avLst/>
+          </a:prstGeom>
+        </p:spPr>
+        <p:style>
+          <a:lnRef idx="2">
+            <a:schemeClr val="accent1">
+              <a:shade val="50000"/>
+            </a:schemeClr>
+          </a:lnRef>
+          <a:fillRef idx="1">
+            <a:schemeClr val="accent1"/>
+          </a:fillRef>
+          <a:effectRef idx="0">
+            <a:schemeClr val="accent1"/>
+          </a:effectRef>
+          <a:fontRef idx="minor">
+            <a:schemeClr val="lt1"/>
+          </a:fontRef>
+        </p:style>
+        <p:txBody>
+          <a:bodyPr rtlCol="0" anchor="ctr"/>
+          <a:lstStyle/>
+          <a:p>
+            <a:pPr algn="ctr"/>
+            <a:r>
+              <a:rPr lang="en-US" dirty="0" smtClean="0">
+                <a:latin typeface="Arial" charset="0"/>
+                <a:ea typeface="Arial" charset="0"/>
+                <a:cs typeface="Arial" charset="0"/>
+              </a:rPr>
+              <a:t>Conditioning</a:t>
+            </a:r>
+          </a:p>
+        </p:txBody>
+      </p:sp>
+      <p:sp>
+        <p:nvSpPr>
+          <p:cNvPr id="10" name="Rectangle 9"/>
+          <p:cNvSpPr/>
+          <p:nvPr/>
+        </p:nvSpPr>
+        <p:spPr>
+          <a:xfrm>
+            <a:off x="11725700" y="2281451"/>
+            <a:ext cx="2699982" cy="914400"/>
+          </a:xfrm>
+          <a:prstGeom prst="rect">
+            <a:avLst/>
+          </a:prstGeom>
+        </p:spPr>
+        <p:style>
+          <a:lnRef idx="2">
+            <a:schemeClr val="accent1">
+              <a:shade val="50000"/>
+            </a:schemeClr>
+          </a:lnRef>
+          <a:fillRef idx="1">
+            <a:schemeClr val="accent1"/>
+          </a:fillRef>
+          <a:effectRef idx="0">
+            <a:schemeClr val="accent1"/>
+          </a:effectRef>
+          <a:fontRef idx="minor">
+            <a:schemeClr val="lt1"/>
+          </a:fontRef>
+        </p:style>
+        <p:txBody>
+          <a:bodyPr rtlCol="0" anchor="ctr"/>
+          <a:lstStyle/>
+          <a:p>
+            <a:pPr algn="ctr"/>
+            <a:r>
+              <a:rPr lang="en-US" dirty="0" smtClean="0">
+                <a:latin typeface="Arial" charset="0"/>
+                <a:ea typeface="Arial" charset="0"/>
+                <a:cs typeface="Arial" charset="0"/>
+              </a:rPr>
+              <a:t>Social Interaction</a:t>
+            </a:r>
+          </a:p>
+        </p:txBody>
+      </p:sp>
+      <p:sp>
+        <p:nvSpPr>
+          <p:cNvPr id="11" name="TextBox 10"/>
+          <p:cNvSpPr txBox="1"/>
+          <p:nvPr/>
+        </p:nvSpPr>
+        <p:spPr>
+          <a:xfrm>
+            <a:off x="890685" y="3807725"/>
+            <a:ext cx="1223412" cy="369332"/>
+          </a:xfrm>
+          <a:prstGeom prst="rect">
+            <a:avLst/>
+          </a:prstGeom>
+          <a:noFill/>
+        </p:spPr>
+        <p:txBody>
+          <a:bodyPr wrap="none" rtlCol="0">
+            <a:spAutoFit/>
+          </a:bodyPr>
+          <a:lstStyle/>
+          <a:p>
+            <a:r>
+              <a:rPr lang="en-US" dirty="0" smtClean="0">
+                <a:latin typeface="Arial" charset="0"/>
+                <a:ea typeface="Arial" charset="0"/>
+                <a:cs typeface="Arial" charset="0"/>
+              </a:rPr>
+              <a:t>Reduction</a:t>
+            </a:r>
+            <a:endParaRPr lang="en-US" dirty="0">
+              <a:latin typeface="Arial" charset="0"/>
+              <a:ea typeface="Arial" charset="0"/>
+              <a:cs typeface="Arial" charset="0"/>
+            </a:endParaRPr>
+          </a:p>
+        </p:txBody>
+      </p:sp>
+      <p:sp>
+        <p:nvSpPr>
+          <p:cNvPr id="12" name="TextBox 11"/>
+          <p:cNvSpPr txBox="1"/>
+          <p:nvPr/>
+        </p:nvSpPr>
+        <p:spPr>
+          <a:xfrm>
+            <a:off x="890685" y="4287671"/>
+            <a:ext cx="1240532" cy="369332"/>
+          </a:xfrm>
+          <a:prstGeom prst="rect">
+            <a:avLst/>
+          </a:prstGeom>
+          <a:noFill/>
+        </p:spPr>
+        <p:txBody>
+          <a:bodyPr wrap="none" rtlCol="0">
+            <a:spAutoFit/>
+          </a:bodyPr>
+          <a:lstStyle/>
+          <a:p>
+            <a:r>
+              <a:rPr lang="en-US" dirty="0" err="1" smtClean="0">
+                <a:latin typeface="Arial" charset="0"/>
+                <a:ea typeface="Arial" charset="0"/>
+                <a:cs typeface="Arial" charset="0"/>
+              </a:rPr>
+              <a:t>Tunnelling</a:t>
+            </a:r>
+            <a:endParaRPr lang="en-US" dirty="0">
+              <a:latin typeface="Arial" charset="0"/>
+              <a:ea typeface="Arial" charset="0"/>
+              <a:cs typeface="Arial" charset="0"/>
+            </a:endParaRPr>
+          </a:p>
+        </p:txBody>
+      </p:sp>
+      <p:cxnSp>
+        <p:nvCxnSpPr>
+          <p:cNvPr id="14" name="Elbow Connector 13"/>
+          <p:cNvCxnSpPr>
+            <a:stCxn id="6" idx="2"/>
+            <a:endCxn id="11" idx="1"/>
+          </p:cNvCxnSpPr>
+          <p:nvPr/>
+        </p:nvCxnSpPr>
+        <p:spPr>
+          <a:xfrm rot="5400000">
+            <a:off x="798268" y="3288268"/>
+            <a:ext cx="796540" cy="611706"/>
+          </a:xfrm>
+          <a:prstGeom prst="bentConnector4">
+            <a:avLst>
+              <a:gd name="adj1" fmla="val 38408"/>
+              <a:gd name="adj2" fmla="val 137371"/>
+            </a:avLst>
+          </a:prstGeom>
+          <a:ln w="19050">
+            <a:solidFill>
+              <a:schemeClr val="accent1">
+                <a:lumMod val="50000"/>
+              </a:schemeClr>
+            </a:solidFill>
+          </a:ln>
+        </p:spPr>
+        <p:style>
+          <a:lnRef idx="1">
+            <a:schemeClr val="accent1"/>
+          </a:lnRef>
+          <a:fillRef idx="0">
+            <a:schemeClr val="accent1"/>
+          </a:fillRef>
+          <a:effectRef idx="0">
+            <a:schemeClr val="accent1"/>
+          </a:effectRef>
+          <a:fontRef idx="minor">
+            <a:schemeClr val="tx1"/>
+          </a:fontRef>
+        </p:style>
+      </p:cxnSp>
+      <p:cxnSp>
+        <p:nvCxnSpPr>
+          <p:cNvPr id="15" name="Elbow Connector 14"/>
+          <p:cNvCxnSpPr>
+            <a:stCxn id="6" idx="2"/>
+            <a:endCxn id="12" idx="1"/>
+          </p:cNvCxnSpPr>
+          <p:nvPr/>
+        </p:nvCxnSpPr>
+        <p:spPr>
+          <a:xfrm rot="5400000">
+            <a:off x="558295" y="3528241"/>
+            <a:ext cx="1276486" cy="611706"/>
+          </a:xfrm>
+          <a:prstGeom prst="bentConnector4">
+            <a:avLst>
+              <a:gd name="adj1" fmla="val 42767"/>
+              <a:gd name="adj2" fmla="val 137371"/>
+            </a:avLst>
+          </a:prstGeom>
+          <a:ln w="19050">
+            <a:solidFill>
+              <a:schemeClr val="accent1">
+                <a:lumMod val="50000"/>
+              </a:schemeClr>
+            </a:solidFill>
+          </a:ln>
+        </p:spPr>
+        <p:style>
+          <a:lnRef idx="1">
+            <a:schemeClr val="accent1"/>
+          </a:lnRef>
+          <a:fillRef idx="0">
+            <a:schemeClr val="accent1"/>
+          </a:fillRef>
+          <a:effectRef idx="0">
+            <a:schemeClr val="accent1"/>
+          </a:effectRef>
+          <a:fontRef idx="minor">
+            <a:schemeClr val="tx1"/>
+          </a:fontRef>
+        </p:style>
+      </p:cxnSp>
+    </p:spTree>
+    <p:extLst>
+      <p:ext uri="{BB962C8B-B14F-4D97-AF65-F5344CB8AC3E}">
+        <p14:creationId xmlns:p14="http://schemas.microsoft.com/office/powerpoint/2010/main" val="876788303"/>
+      </p:ext>
+    </p:extLst>
+  </p:cSld>
+  <p:clrMapOvr>
+    <a:masterClrMapping/>
+  </p:clrMapOvr>
+</p:sld>
+</file>
+
 <file path=ppt/theme/theme1.xml><?xml version="1.0" encoding="utf-8"?>
 <a:theme xmlns:a="http://schemas.openxmlformats.org/drawingml/2006/main" name="Office Theme">
   <a:themeElements>

</xml_diff>

<commit_message>
auto commit Fri Jan 19 11:33:12 CET 2018
</commit_message>
<xml_diff>
--- a/raw/figures/rw/pw-life-cycle-rebuilt.pptx
+++ b/raw/figures/rw/pw-life-cycle-rebuilt.pptx
@@ -8,6 +8,7 @@
     <p:sldId id="257" r:id="rId2"/>
     <p:sldId id="258" r:id="rId3"/>
     <p:sldId id="259" r:id="rId4"/>
+    <p:sldId id="260" r:id="rId5"/>
   </p:sldIdLst>
   <p:sldSz cx="12192000" cy="6858000"/>
   <p:notesSz cx="6858000" cy="9144000"/>
@@ -302,11 +303,11 @@
           <c:showBubbleSize val="0"/>
         </c:dLbls>
         <c:gapWidth val="32"/>
-        <c:axId val="-1189948048"/>
-        <c:axId val="-1189182512"/>
+        <c:axId val="1153454256"/>
+        <c:axId val="1239684592"/>
       </c:barChart>
       <c:catAx>
-        <c:axId val="-1189948048"/>
+        <c:axId val="1153454256"/>
         <c:scaling>
           <c:orientation val="minMax"/>
         </c:scaling>
@@ -349,7 +350,7 @@
             <a:endParaRPr lang="en-US"/>
           </a:p>
         </c:txPr>
-        <c:crossAx val="-1189182512"/>
+        <c:crossAx val="1239684592"/>
         <c:crosses val="autoZero"/>
         <c:auto val="1"/>
         <c:lblAlgn val="ctr"/>
@@ -357,7 +358,7 @@
         <c:noMultiLvlLbl val="0"/>
       </c:catAx>
       <c:valAx>
-        <c:axId val="-1189182512"/>
+        <c:axId val="1239684592"/>
         <c:scaling>
           <c:orientation val="minMax"/>
         </c:scaling>
@@ -407,7 +408,7 @@
             <a:endParaRPr lang="en-US"/>
           </a:p>
         </c:txPr>
-        <c:crossAx val="-1189948048"/>
+        <c:crossAx val="1153454256"/>
         <c:crosses val="autoZero"/>
         <c:crossBetween val="between"/>
       </c:valAx>
@@ -1122,7 +1123,7 @@
           <a:p>
             <a:fld id="{BCCC3F5F-73A4-A245-A21B-40DFEEF01980}" type="datetimeFigureOut">
               <a:rPr lang="en-US" smtClean="0"/>
-              <a:t>1/12/18</a:t>
+              <a:t>1/19/18</a:t>
             </a:fld>
             <a:endParaRPr lang="en-US"/>
           </a:p>
@@ -1292,7 +1293,7 @@
           <a:p>
             <a:fld id="{BCCC3F5F-73A4-A245-A21B-40DFEEF01980}" type="datetimeFigureOut">
               <a:rPr lang="en-US" smtClean="0"/>
-              <a:t>1/12/18</a:t>
+              <a:t>1/19/18</a:t>
             </a:fld>
             <a:endParaRPr lang="en-US"/>
           </a:p>
@@ -1472,7 +1473,7 @@
           <a:p>
             <a:fld id="{BCCC3F5F-73A4-A245-A21B-40DFEEF01980}" type="datetimeFigureOut">
               <a:rPr lang="en-US" smtClean="0"/>
-              <a:t>1/12/18</a:t>
+              <a:t>1/19/18</a:t>
             </a:fld>
             <a:endParaRPr lang="en-US"/>
           </a:p>
@@ -1642,7 +1643,7 @@
           <a:p>
             <a:fld id="{BCCC3F5F-73A4-A245-A21B-40DFEEF01980}" type="datetimeFigureOut">
               <a:rPr lang="en-US" smtClean="0"/>
-              <a:t>1/12/18</a:t>
+              <a:t>1/19/18</a:t>
             </a:fld>
             <a:endParaRPr lang="en-US"/>
           </a:p>
@@ -1888,7 +1889,7 @@
           <a:p>
             <a:fld id="{BCCC3F5F-73A4-A245-A21B-40DFEEF01980}" type="datetimeFigureOut">
               <a:rPr lang="en-US" smtClean="0"/>
-              <a:t>1/12/18</a:t>
+              <a:t>1/19/18</a:t>
             </a:fld>
             <a:endParaRPr lang="en-US"/>
           </a:p>
@@ -2120,7 +2121,7 @@
           <a:p>
             <a:fld id="{BCCC3F5F-73A4-A245-A21B-40DFEEF01980}" type="datetimeFigureOut">
               <a:rPr lang="en-US" smtClean="0"/>
-              <a:t>1/12/18</a:t>
+              <a:t>1/19/18</a:t>
             </a:fld>
             <a:endParaRPr lang="en-US"/>
           </a:p>
@@ -2487,7 +2488,7 @@
           <a:p>
             <a:fld id="{BCCC3F5F-73A4-A245-A21B-40DFEEF01980}" type="datetimeFigureOut">
               <a:rPr lang="en-US" smtClean="0"/>
-              <a:t>1/12/18</a:t>
+              <a:t>1/19/18</a:t>
             </a:fld>
             <a:endParaRPr lang="en-US"/>
           </a:p>
@@ -2605,7 +2606,7 @@
           <a:p>
             <a:fld id="{BCCC3F5F-73A4-A245-A21B-40DFEEF01980}" type="datetimeFigureOut">
               <a:rPr lang="en-US" smtClean="0"/>
-              <a:t>1/12/18</a:t>
+              <a:t>1/19/18</a:t>
             </a:fld>
             <a:endParaRPr lang="en-US"/>
           </a:p>
@@ -2700,7 +2701,7 @@
           <a:p>
             <a:fld id="{BCCC3F5F-73A4-A245-A21B-40DFEEF01980}" type="datetimeFigureOut">
               <a:rPr lang="en-US" smtClean="0"/>
-              <a:t>1/12/18</a:t>
+              <a:t>1/19/18</a:t>
             </a:fld>
             <a:endParaRPr lang="en-US"/>
           </a:p>
@@ -2977,7 +2978,7 @@
           <a:p>
             <a:fld id="{BCCC3F5F-73A4-A245-A21B-40DFEEF01980}" type="datetimeFigureOut">
               <a:rPr lang="en-US" smtClean="0"/>
-              <a:t>1/12/18</a:t>
+              <a:t>1/19/18</a:t>
             </a:fld>
             <a:endParaRPr lang="en-US"/>
           </a:p>
@@ -3230,7 +3231,7 @@
           <a:p>
             <a:fld id="{BCCC3F5F-73A4-A245-A21B-40DFEEF01980}" type="datetimeFigureOut">
               <a:rPr lang="en-US" smtClean="0"/>
-              <a:t>1/12/18</a:t>
+              <a:t>1/19/18</a:t>
             </a:fld>
             <a:endParaRPr lang="en-US"/>
           </a:p>
@@ -3443,7 +3444,7 @@
           <a:p>
             <a:fld id="{BCCC3F5F-73A4-A245-A21B-40DFEEF01980}" type="datetimeFigureOut">
               <a:rPr lang="en-US" smtClean="0"/>
-              <a:t>1/12/18</a:t>
+              <a:t>1/19/18</a:t>
             </a:fld>
             <a:endParaRPr lang="en-US"/>
           </a:p>
@@ -5162,6 +5163,489 @@
 </p:sld>
 </file>
 
+<file path=ppt/slides/slide4.xml><?xml version="1.0" encoding="utf-8"?>
+<p:sld xmlns:a="http://schemas.openxmlformats.org/drawingml/2006/main" xmlns:r="http://schemas.openxmlformats.org/officeDocument/2006/relationships" xmlns:p="http://schemas.openxmlformats.org/presentationml/2006/main">
+  <p:cSld>
+    <p:spTree>
+      <p:nvGrpSpPr>
+        <p:cNvPr id="1" name=""/>
+        <p:cNvGrpSpPr/>
+        <p:nvPr/>
+      </p:nvGrpSpPr>
+      <p:grpSpPr>
+        <a:xfrm>
+          <a:off x="0" y="0"/>
+          <a:ext cx="0" cy="0"/>
+          <a:chOff x="0" y="0"/>
+          <a:chExt cx="0" cy="0"/>
+        </a:xfrm>
+      </p:grpSpPr>
+      <p:sp>
+        <p:nvSpPr>
+          <p:cNvPr id="2" name="Rectangle 1"/>
+          <p:cNvSpPr/>
+          <p:nvPr/>
+        </p:nvSpPr>
+        <p:spPr>
+          <a:xfrm>
+            <a:off x="222914" y="1353868"/>
+            <a:ext cx="2861480" cy="5078313"/>
+          </a:xfrm>
+          <a:prstGeom prst="rect">
+            <a:avLst/>
+          </a:prstGeom>
+          <a:solidFill>
+            <a:schemeClr val="bg1"/>
+          </a:solidFill>
+          <a:ln>
+            <a:solidFill>
+              <a:schemeClr val="accent1"/>
+            </a:solidFill>
+          </a:ln>
+        </p:spPr>
+        <p:txBody>
+          <a:bodyPr wrap="square">
+            <a:spAutoFit/>
+          </a:bodyPr>
+          <a:lstStyle/>
+          <a:p>
+            <a:r>
+              <a:rPr lang="en-US" dirty="0">
+                <a:latin typeface="Arial" charset="0"/>
+                <a:ea typeface="Arial" charset="0"/>
+                <a:cs typeface="Arial" charset="0"/>
+              </a:rPr>
+              <a:t>Loss </a:t>
+            </a:r>
+            <a:r>
+              <a:rPr lang="en-US" dirty="0" smtClean="0">
+                <a:latin typeface="Arial" charset="0"/>
+                <a:ea typeface="Arial" charset="0"/>
+                <a:cs typeface="Arial" charset="0"/>
+              </a:rPr>
+              <a:t>Aversion</a:t>
+            </a:r>
+          </a:p>
+          <a:p>
+            <a:r>
+              <a:rPr lang="en-US" dirty="0" smtClean="0">
+                <a:latin typeface="Arial" charset="0"/>
+                <a:ea typeface="Arial" charset="0"/>
+                <a:cs typeface="Arial" charset="0"/>
+              </a:rPr>
+              <a:t>Loss Aversion</a:t>
+            </a:r>
+          </a:p>
+          <a:p>
+            <a:r>
+              <a:rPr lang="en-US" dirty="0" smtClean="0">
+                <a:latin typeface="Arial" charset="0"/>
+                <a:ea typeface="Arial" charset="0"/>
+                <a:cs typeface="Arial" charset="0"/>
+              </a:rPr>
+              <a:t>Status-Quo Bias</a:t>
+            </a:r>
+          </a:p>
+          <a:p>
+            <a:r>
+              <a:rPr lang="en-US" dirty="0" smtClean="0">
+                <a:latin typeface="Arial" charset="0"/>
+                <a:ea typeface="Arial" charset="0"/>
+                <a:cs typeface="Arial" charset="0"/>
+              </a:rPr>
+              <a:t>Framing Mini</a:t>
+            </a:r>
+          </a:p>
+          <a:p>
+            <a:r>
+              <a:rPr lang="en-US" dirty="0" smtClean="0">
+                <a:latin typeface="Arial" charset="0"/>
+                <a:ea typeface="Arial" charset="0"/>
+                <a:cs typeface="Arial" charset="0"/>
+              </a:rPr>
+              <a:t>Endowment Effect</a:t>
+            </a:r>
+          </a:p>
+          <a:p>
+            <a:r>
+              <a:rPr lang="en-US" dirty="0" smtClean="0">
+                <a:latin typeface="Arial" charset="0"/>
+                <a:ea typeface="Arial" charset="0"/>
+                <a:cs typeface="Arial" charset="0"/>
+              </a:rPr>
+              <a:t>Negativity bias</a:t>
+            </a:r>
+          </a:p>
+          <a:p>
+            <a:r>
+              <a:rPr lang="en-US" dirty="0" smtClean="0">
+                <a:latin typeface="Arial" charset="0"/>
+                <a:ea typeface="Arial" charset="0"/>
+                <a:cs typeface="Arial" charset="0"/>
+              </a:rPr>
+              <a:t>Optimism </a:t>
+            </a:r>
+            <a:r>
+              <a:rPr lang="en-US" dirty="0">
+                <a:latin typeface="Arial" charset="0"/>
+                <a:ea typeface="Arial" charset="0"/>
+                <a:cs typeface="Arial" charset="0"/>
+              </a:rPr>
+              <a:t>Bias </a:t>
+            </a:r>
+            <a:r>
+              <a:rPr lang="en-US" dirty="0" smtClean="0">
+                <a:latin typeface="Arial" charset="0"/>
+                <a:ea typeface="Arial" charset="0"/>
+                <a:cs typeface="Arial" charset="0"/>
+              </a:rPr>
+              <a:t>Mini</a:t>
+            </a:r>
+          </a:p>
+          <a:p>
+            <a:r>
+              <a:rPr lang="en-US" dirty="0" smtClean="0">
+                <a:latin typeface="Arial" charset="0"/>
+                <a:ea typeface="Arial" charset="0"/>
+                <a:cs typeface="Arial" charset="0"/>
+              </a:rPr>
+              <a:t>Other </a:t>
+            </a:r>
+            <a:r>
+              <a:rPr lang="en-US" dirty="0">
+                <a:latin typeface="Arial" charset="0"/>
+                <a:ea typeface="Arial" charset="0"/>
+                <a:cs typeface="Arial" charset="0"/>
+              </a:rPr>
+              <a:t>cognitive </a:t>
+            </a:r>
+            <a:r>
+              <a:rPr lang="en-US" dirty="0" smtClean="0">
+                <a:latin typeface="Arial" charset="0"/>
+                <a:ea typeface="Arial" charset="0"/>
+                <a:cs typeface="Arial" charset="0"/>
+              </a:rPr>
+              <a:t>biases</a:t>
+            </a:r>
+          </a:p>
+          <a:p>
+            <a:r>
+              <a:rPr lang="en-US" dirty="0" smtClean="0">
+                <a:latin typeface="Arial" charset="0"/>
+                <a:ea typeface="Arial" charset="0"/>
+                <a:cs typeface="Arial" charset="0"/>
+              </a:rPr>
+              <a:t>Illusion </a:t>
+            </a:r>
+            <a:r>
+              <a:rPr lang="en-US" dirty="0">
+                <a:latin typeface="Arial" charset="0"/>
+                <a:ea typeface="Arial" charset="0"/>
+                <a:cs typeface="Arial" charset="0"/>
+              </a:rPr>
+              <a:t>of </a:t>
+            </a:r>
+            <a:r>
+              <a:rPr lang="en-US" dirty="0" smtClean="0">
+                <a:latin typeface="Arial" charset="0"/>
+                <a:ea typeface="Arial" charset="0"/>
+                <a:cs typeface="Arial" charset="0"/>
+              </a:rPr>
+              <a:t>control</a:t>
+            </a:r>
+          </a:p>
+          <a:p>
+            <a:r>
+              <a:rPr lang="en-US" dirty="0" smtClean="0">
+                <a:latin typeface="Arial" charset="0"/>
+                <a:ea typeface="Arial" charset="0"/>
+                <a:cs typeface="Arial" charset="0"/>
+              </a:rPr>
+              <a:t>Need </a:t>
+            </a:r>
+            <a:r>
+              <a:rPr lang="en-US" dirty="0">
+                <a:latin typeface="Arial" charset="0"/>
+                <a:ea typeface="Arial" charset="0"/>
+                <a:cs typeface="Arial" charset="0"/>
+              </a:rPr>
+              <a:t>for </a:t>
+            </a:r>
+            <a:r>
+              <a:rPr lang="en-US" dirty="0" smtClean="0">
+                <a:latin typeface="Arial" charset="0"/>
+                <a:ea typeface="Arial" charset="0"/>
+                <a:cs typeface="Arial" charset="0"/>
+              </a:rPr>
+              <a:t>closure</a:t>
+            </a:r>
+          </a:p>
+          <a:p>
+            <a:r>
+              <a:rPr lang="en-US" dirty="0" smtClean="0">
+                <a:latin typeface="Arial" charset="0"/>
+                <a:ea typeface="Arial" charset="0"/>
+                <a:cs typeface="Arial" charset="0"/>
+              </a:rPr>
+              <a:t>Peak-end rule</a:t>
+            </a:r>
+          </a:p>
+          <a:p>
+            <a:r>
+              <a:rPr lang="en-US" dirty="0" smtClean="0">
+                <a:latin typeface="Arial" charset="0"/>
+                <a:ea typeface="Arial" charset="0"/>
+                <a:cs typeface="Arial" charset="0"/>
+              </a:rPr>
+              <a:t>Curiosity Mini</a:t>
+            </a:r>
+          </a:p>
+          <a:p>
+            <a:r>
+              <a:rPr lang="en-US" dirty="0" smtClean="0">
+                <a:latin typeface="Arial" charset="0"/>
+                <a:ea typeface="Arial" charset="0"/>
+                <a:cs typeface="Arial" charset="0"/>
+              </a:rPr>
+              <a:t>Value </a:t>
+            </a:r>
+            <a:r>
+              <a:rPr lang="en-US" dirty="0">
+                <a:latin typeface="Arial" charset="0"/>
+                <a:ea typeface="Arial" charset="0"/>
+                <a:cs typeface="Arial" charset="0"/>
+              </a:rPr>
+              <a:t>attribution </a:t>
+            </a:r>
+            <a:r>
+              <a:rPr lang="en-US" dirty="0" smtClean="0">
+                <a:latin typeface="Arial" charset="0"/>
+                <a:ea typeface="Arial" charset="0"/>
+                <a:cs typeface="Arial" charset="0"/>
+              </a:rPr>
+              <a:t>Mini</a:t>
+            </a:r>
+          </a:p>
+          <a:p>
+            <a:r>
+              <a:rPr lang="en-US" dirty="0" smtClean="0">
+                <a:latin typeface="Arial" charset="0"/>
+                <a:ea typeface="Arial" charset="0"/>
+                <a:cs typeface="Arial" charset="0"/>
+              </a:rPr>
+              <a:t>Set </a:t>
+            </a:r>
+            <a:r>
+              <a:rPr lang="en-US" dirty="0">
+                <a:latin typeface="Arial" charset="0"/>
+                <a:ea typeface="Arial" charset="0"/>
+                <a:cs typeface="Arial" charset="0"/>
+              </a:rPr>
+              <a:t>Completion </a:t>
+            </a:r>
+            <a:r>
+              <a:rPr lang="en-US" dirty="0" smtClean="0">
+                <a:latin typeface="Arial" charset="0"/>
+                <a:ea typeface="Arial" charset="0"/>
+                <a:cs typeface="Arial" charset="0"/>
+              </a:rPr>
+              <a:t>Mini</a:t>
+            </a:r>
+          </a:p>
+          <a:p>
+            <a:r>
+              <a:rPr lang="en-US" dirty="0" smtClean="0">
+                <a:latin typeface="Arial" charset="0"/>
+                <a:ea typeface="Arial" charset="0"/>
+                <a:cs typeface="Arial" charset="0"/>
+              </a:rPr>
+              <a:t>Scarcity</a:t>
+            </a:r>
+          </a:p>
+          <a:p>
+            <a:r>
+              <a:rPr lang="en-US" dirty="0" smtClean="0">
+                <a:latin typeface="Arial" charset="0"/>
+                <a:ea typeface="Arial" charset="0"/>
+                <a:cs typeface="Arial" charset="0"/>
+              </a:rPr>
+              <a:t>Limited </a:t>
+            </a:r>
+            <a:r>
+              <a:rPr lang="en-US" dirty="0">
+                <a:latin typeface="Arial" charset="0"/>
+                <a:ea typeface="Arial" charset="0"/>
+                <a:cs typeface="Arial" charset="0"/>
+              </a:rPr>
+              <a:t>choice </a:t>
+            </a:r>
+            <a:r>
+              <a:rPr lang="en-US" dirty="0" smtClean="0">
+                <a:latin typeface="Arial" charset="0"/>
+                <a:ea typeface="Arial" charset="0"/>
+                <a:cs typeface="Arial" charset="0"/>
+              </a:rPr>
+              <a:t>Mini</a:t>
+            </a:r>
+          </a:p>
+          <a:p>
+            <a:r>
+              <a:rPr lang="en-US" dirty="0" smtClean="0">
+                <a:latin typeface="Arial" charset="0"/>
+                <a:ea typeface="Arial" charset="0"/>
+                <a:cs typeface="Arial" charset="0"/>
+              </a:rPr>
+              <a:t>Scarcity</a:t>
+            </a:r>
+          </a:p>
+          <a:p>
+            <a:r>
+              <a:rPr lang="en-US" dirty="0" smtClean="0">
+                <a:latin typeface="Arial" charset="0"/>
+                <a:ea typeface="Arial" charset="0"/>
+                <a:cs typeface="Arial" charset="0"/>
+              </a:rPr>
+              <a:t>Limited duration</a:t>
+            </a:r>
+            <a:endParaRPr lang="en-US" dirty="0">
+              <a:latin typeface="Arial" charset="0"/>
+              <a:ea typeface="Arial" charset="0"/>
+              <a:cs typeface="Arial" charset="0"/>
+            </a:endParaRPr>
+          </a:p>
+        </p:txBody>
+      </p:sp>
+      <p:sp>
+        <p:nvSpPr>
+          <p:cNvPr id="4" name="Rectangle 3"/>
+          <p:cNvSpPr/>
+          <p:nvPr/>
+        </p:nvSpPr>
+        <p:spPr>
+          <a:xfrm>
+            <a:off x="222914" y="573206"/>
+            <a:ext cx="2861480" cy="780662"/>
+          </a:xfrm>
+          <a:prstGeom prst="rect">
+            <a:avLst/>
+          </a:prstGeom>
+        </p:spPr>
+        <p:style>
+          <a:lnRef idx="2">
+            <a:schemeClr val="accent1">
+              <a:shade val="50000"/>
+            </a:schemeClr>
+          </a:lnRef>
+          <a:fillRef idx="1">
+            <a:schemeClr val="accent1"/>
+          </a:fillRef>
+          <a:effectRef idx="0">
+            <a:schemeClr val="accent1"/>
+          </a:effectRef>
+          <a:fontRef idx="minor">
+            <a:schemeClr val="lt1"/>
+          </a:fontRef>
+        </p:style>
+        <p:txBody>
+          <a:bodyPr rtlCol="0" anchor="ctr"/>
+          <a:lstStyle/>
+          <a:p>
+            <a:pPr algn="ctr"/>
+            <a:r>
+              <a:rPr lang="en-US" dirty="0" smtClean="0">
+                <a:latin typeface="Arial" charset="0"/>
+                <a:ea typeface="Arial" charset="0"/>
+                <a:cs typeface="Arial" charset="0"/>
+              </a:rPr>
+              <a:t>Cognitive</a:t>
+            </a:r>
+            <a:endParaRPr lang="en-US" dirty="0">
+              <a:latin typeface="Arial" charset="0"/>
+              <a:ea typeface="Arial" charset="0"/>
+              <a:cs typeface="Arial" charset="0"/>
+            </a:endParaRPr>
+          </a:p>
+        </p:txBody>
+      </p:sp>
+      <p:sp>
+        <p:nvSpPr>
+          <p:cNvPr id="5" name="Rectangle 4"/>
+          <p:cNvSpPr/>
+          <p:nvPr/>
+        </p:nvSpPr>
+        <p:spPr>
+          <a:xfrm>
+            <a:off x="3084394" y="1353868"/>
+            <a:ext cx="2861480" cy="420341"/>
+          </a:xfrm>
+          <a:prstGeom prst="rect">
+            <a:avLst/>
+          </a:prstGeom>
+          <a:solidFill>
+            <a:schemeClr val="bg1">
+              <a:lumMod val="95000"/>
+            </a:schemeClr>
+          </a:solidFill>
+          <a:ln>
+            <a:noFill/>
+          </a:ln>
+        </p:spPr>
+        <p:style>
+          <a:lnRef idx="2">
+            <a:schemeClr val="accent1">
+              <a:shade val="50000"/>
+            </a:schemeClr>
+          </a:lnRef>
+          <a:fillRef idx="1">
+            <a:schemeClr val="accent1"/>
+          </a:fillRef>
+          <a:effectRef idx="0">
+            <a:schemeClr val="accent1"/>
+          </a:effectRef>
+          <a:fontRef idx="minor">
+            <a:schemeClr val="lt1"/>
+          </a:fontRef>
+        </p:style>
+        <p:txBody>
+          <a:bodyPr rtlCol="0" anchor="ctr"/>
+          <a:lstStyle/>
+          <a:p>
+            <a:pPr algn="ctr"/>
+            <a:r>
+              <a:rPr lang="en-US" smtClean="0">
+                <a:solidFill>
+                  <a:schemeClr val="tx1"/>
+                </a:solidFill>
+                <a:latin typeface="Arial" charset="0"/>
+                <a:ea typeface="Arial" charset="0"/>
+                <a:cs typeface="Arial" charset="0"/>
+              </a:rPr>
+              <a:t>Loss Aversion</a:t>
+            </a:r>
+            <a:endParaRPr lang="en-US" dirty="0">
+              <a:solidFill>
+                <a:schemeClr val="tx1"/>
+              </a:solidFill>
+              <a:latin typeface="Arial" charset="0"/>
+              <a:ea typeface="Arial" charset="0"/>
+              <a:cs typeface="Arial" charset="0"/>
+            </a:endParaRPr>
+          </a:p>
+        </p:txBody>
+      </p:sp>
+    </p:spTree>
+    <p:extLst>
+      <p:ext uri="{BB962C8B-B14F-4D97-AF65-F5344CB8AC3E}">
+        <p14:creationId xmlns:p14="http://schemas.microsoft.com/office/powerpoint/2010/main" val="1216767035"/>
+      </p:ext>
+    </p:extLst>
+  </p:cSld>
+  <p:clrMapOvr>
+    <a:masterClrMapping/>
+  </p:clrMapOvr>
+</p:sld>
+</file>
+
 <file path=ppt/theme/theme1.xml><?xml version="1.0" encoding="utf-8"?>
 <a:theme xmlns:a="http://schemas.openxmlformats.org/drawingml/2006/main" name="Office Theme">
   <a:themeElements>

</xml_diff>